<commit_message>
Se completa seccion Hobbies y Skill
</commit_message>
<xml_diff>
--- a/media/imagenes.pptx
+++ b/media/imagenes.pptx
@@ -104,34 +104,137 @@
       </a:defRPr>
     </a:lvl9pPr>
   </p:defaultTextStyle>
+  <p:extLst>
+    <p:ext uri="{EFAFB233-063F-42B5-8137-9DF3F51BA10A}">
+      <p15:sldGuideLst xmlns:p15="http://schemas.microsoft.com/office/powerpoint/2012/main"/>
+    </p:ext>
+  </p:extLst>
 </p:presentation>
 </file>
 
-<file path=ppt/ink/ink1.xml><?xml version="1.0" encoding="utf-8"?>
-<inkml:ink xmlns:inkml="http://www.w3.org/2003/InkML">
-  <inkml:definitions>
-    <inkml:context xml:id="ctx0">
-      <inkml:inkSource xml:id="inkSrc0">
-        <inkml:traceFormat>
-          <inkml:channel name="X" type="integer" min="-2.14748E9" max="2.14748E9" units="cm"/>
-          <inkml:channel name="Y" type="integer" min="-2.14748E9" max="2.14748E9" units="cm"/>
-          <inkml:channel name="F" type="integer" max="32767" units="dev"/>
-        </inkml:traceFormat>
-        <inkml:channelProperties>
-          <inkml:channelProperty channel="X" name="resolution" value="1000" units="1/cm"/>
-          <inkml:channelProperty channel="Y" name="resolution" value="1000" units="1/cm"/>
-          <inkml:channelProperty channel="F" name="resolution" value="0" units="1/dev"/>
-        </inkml:channelProperties>
-      </inkml:inkSource>
-      <inkml:timestamp xml:id="ts0" timeString="2022-03-17T00:54:50.310"/>
-    </inkml:context>
-    <inkml:brush xml:id="br0">
-      <inkml:brushProperty name="width" value="0.05" units="cm"/>
-      <inkml:brushProperty name="height" value="0.05" units="cm"/>
-    </inkml:brush>
-  </inkml:definitions>
-  <inkml:trace contextRef="#ctx0" brushRef="#br0">0 1 24575,'0'0'-8191</inkml:trace>
-</inkml:ink>
+<file path=ppt/revisionInfo.xml><?xml version="1.0" encoding="utf-8"?>
+<p1510:revInfo xmlns:a="http://schemas.openxmlformats.org/drawingml/2006/main" xmlns:r="http://schemas.openxmlformats.org/officeDocument/2006/relationships" xmlns:p1510="http://schemas.microsoft.com/office/powerpoint/2015/10/main">
+  <p1510:revLst>
+    <p1510:client id="{9E59245F-3329-463E-852B-63A0B238C239}" v="3" dt="2022-03-20T08:16:11.995"/>
+  </p1510:revLst>
+</p1510:revInfo>
+</file>
+
+<file path=ppt/changesInfos/changesInfo1.xml><?xml version="1.0" encoding="utf-8"?>
+<pc:chgInfo xmlns:a="http://schemas.openxmlformats.org/drawingml/2006/main" xmlns:r="http://schemas.openxmlformats.org/officeDocument/2006/relationships" xmlns:ac="http://schemas.microsoft.com/office/drawing/2013/main/command" xmlns:pc="http://schemas.microsoft.com/office/powerpoint/2013/main/command">
+  <pc:docChgLst>
+    <pc:chgData name="Oscar Cita" userId="7f8d94126e5d8e0d" providerId="LiveId" clId="{9E59245F-3329-463E-852B-63A0B238C239}"/>
+    <pc:docChg chg="custSel modSld">
+      <pc:chgData name="Oscar Cita" userId="7f8d94126e5d8e0d" providerId="LiveId" clId="{9E59245F-3329-463E-852B-63A0B238C239}" dt="2022-03-20T08:19:27.279" v="50" actId="1076"/>
+      <pc:docMkLst>
+        <pc:docMk/>
+      </pc:docMkLst>
+      <pc:sldChg chg="addSp delSp modSp mod">
+        <pc:chgData name="Oscar Cita" userId="7f8d94126e5d8e0d" providerId="LiveId" clId="{9E59245F-3329-463E-852B-63A0B238C239}" dt="2022-03-20T08:19:27.279" v="50" actId="1076"/>
+        <pc:sldMkLst>
+          <pc:docMk/>
+          <pc:sldMk cId="4058740216" sldId="256"/>
+        </pc:sldMkLst>
+        <pc:spChg chg="del mod">
+          <ac:chgData name="Oscar Cita" userId="7f8d94126e5d8e0d" providerId="LiveId" clId="{9E59245F-3329-463E-852B-63A0B238C239}" dt="2022-03-20T08:17:58.949" v="48" actId="478"/>
+          <ac:spMkLst>
+            <pc:docMk/>
+            <pc:sldMk cId="4058740216" sldId="256"/>
+            <ac:spMk id="9" creationId="{C6FD7F31-419D-4128-A4BA-18790853552F}"/>
+          </ac:spMkLst>
+        </pc:spChg>
+        <pc:spChg chg="del mod">
+          <ac:chgData name="Oscar Cita" userId="7f8d94126e5d8e0d" providerId="LiveId" clId="{9E59245F-3329-463E-852B-63A0B238C239}" dt="2022-03-20T08:17:55.195" v="46" actId="478"/>
+          <ac:spMkLst>
+            <pc:docMk/>
+            <pc:sldMk cId="4058740216" sldId="256"/>
+            <ac:spMk id="10" creationId="{C7AA86AC-DB02-4F50-A52C-7EF71C23175B}"/>
+          </ac:spMkLst>
+        </pc:spChg>
+        <pc:grpChg chg="mod">
+          <ac:chgData name="Oscar Cita" userId="7f8d94126e5d8e0d" providerId="LiveId" clId="{9E59245F-3329-463E-852B-63A0B238C239}" dt="2022-03-20T08:08:39.904" v="1" actId="1076"/>
+          <ac:grpSpMkLst>
+            <pc:docMk/>
+            <pc:sldMk cId="4058740216" sldId="256"/>
+            <ac:grpSpMk id="17" creationId="{1D65A095-BDD4-446B-BE96-72EFB0BA4847}"/>
+          </ac:grpSpMkLst>
+        </pc:grpChg>
+        <pc:grpChg chg="add mod">
+          <ac:chgData name="Oscar Cita" userId="7f8d94126e5d8e0d" providerId="LiveId" clId="{9E59245F-3329-463E-852B-63A0B238C239}" dt="2022-03-20T08:17:16.081" v="44" actId="1076"/>
+          <ac:grpSpMkLst>
+            <pc:docMk/>
+            <pc:sldMk cId="4058740216" sldId="256"/>
+            <ac:grpSpMk id="24" creationId="{9320692C-5415-43CB-A951-17F3A5114376}"/>
+          </ac:grpSpMkLst>
+        </pc:grpChg>
+        <pc:grpChg chg="mod">
+          <ac:chgData name="Oscar Cita" userId="7f8d94126e5d8e0d" providerId="LiveId" clId="{9E59245F-3329-463E-852B-63A0B238C239}" dt="2022-03-20T08:08:36.114" v="0" actId="1076"/>
+          <ac:grpSpMkLst>
+            <pc:docMk/>
+            <pc:sldMk cId="4058740216" sldId="256"/>
+            <ac:grpSpMk id="32" creationId="{8CD24AB5-B67E-4E79-8582-0223A55C3750}"/>
+          </ac:grpSpMkLst>
+        </pc:grpChg>
+        <pc:picChg chg="add del mod">
+          <ac:chgData name="Oscar Cita" userId="7f8d94126e5d8e0d" providerId="LiveId" clId="{9E59245F-3329-463E-852B-63A0B238C239}" dt="2022-03-20T08:15:38.149" v="18" actId="478"/>
+          <ac:picMkLst>
+            <pc:docMk/>
+            <pc:sldMk cId="4058740216" sldId="256"/>
+            <ac:picMk id="3" creationId="{09BB4083-7E70-4F90-A94F-856E9F829F00}"/>
+          </ac:picMkLst>
+        </pc:picChg>
+        <pc:picChg chg="add mod">
+          <ac:chgData name="Oscar Cita" userId="7f8d94126e5d8e0d" providerId="LiveId" clId="{9E59245F-3329-463E-852B-63A0B238C239}" dt="2022-03-20T08:19:27.279" v="50" actId="1076"/>
+          <ac:picMkLst>
+            <pc:docMk/>
+            <pc:sldMk cId="4058740216" sldId="256"/>
+            <ac:picMk id="6" creationId="{24C91E4D-2214-4B51-A776-1D695991B62E}"/>
+          </ac:picMkLst>
+        </pc:picChg>
+        <pc:picChg chg="add mod">
+          <ac:chgData name="Oscar Cita" userId="7f8d94126e5d8e0d" providerId="LiveId" clId="{9E59245F-3329-463E-852B-63A0B238C239}" dt="2022-03-20T08:16:54.134" v="41" actId="14100"/>
+          <ac:picMkLst>
+            <pc:docMk/>
+            <pc:sldMk cId="4058740216" sldId="256"/>
+            <ac:picMk id="12" creationId="{CCB69D72-597C-4FEC-8A1E-D7401C100EB7}"/>
+          </ac:picMkLst>
+        </pc:picChg>
+        <pc:picChg chg="add mod">
+          <ac:chgData name="Oscar Cita" userId="7f8d94126e5d8e0d" providerId="LiveId" clId="{9E59245F-3329-463E-852B-63A0B238C239}" dt="2022-03-20T08:17:09.673" v="43" actId="14100"/>
+          <ac:picMkLst>
+            <pc:docMk/>
+            <pc:sldMk cId="4058740216" sldId="256"/>
+            <ac:picMk id="15" creationId="{B3C5E0FC-5222-4970-9E1A-5CBDDA262E8B}"/>
+          </ac:picMkLst>
+        </pc:picChg>
+        <pc:picChg chg="add mod">
+          <ac:chgData name="Oscar Cita" userId="7f8d94126e5d8e0d" providerId="LiveId" clId="{9E59245F-3329-463E-852B-63A0B238C239}" dt="2022-03-20T08:16:11.995" v="22" actId="164"/>
+          <ac:picMkLst>
+            <pc:docMk/>
+            <pc:sldMk cId="4058740216" sldId="256"/>
+            <ac:picMk id="19" creationId="{DE0E5ECE-B382-4234-A0CD-68E87A6346FC}"/>
+          </ac:picMkLst>
+        </pc:picChg>
+        <pc:picChg chg="add mod">
+          <ac:chgData name="Oscar Cita" userId="7f8d94126e5d8e0d" providerId="LiveId" clId="{9E59245F-3329-463E-852B-63A0B238C239}" dt="2022-03-20T08:16:11.995" v="22" actId="164"/>
+          <ac:picMkLst>
+            <pc:docMk/>
+            <pc:sldMk cId="4058740216" sldId="256"/>
+            <ac:picMk id="23" creationId="{F61752F7-FB9F-436C-8582-6E141CA567B4}"/>
+          </ac:picMkLst>
+        </pc:picChg>
+        <pc:inkChg chg="del mod">
+          <ac:chgData name="Oscar Cita" userId="7f8d94126e5d8e0d" providerId="LiveId" clId="{9E59245F-3329-463E-852B-63A0B238C239}" dt="2022-03-20T08:18:26.498" v="49" actId="478"/>
+          <ac:inkMkLst>
+            <pc:docMk/>
+            <pc:sldMk cId="4058740216" sldId="256"/>
+            <ac:inkMk id="14" creationId="{A946909F-FA28-4708-BCDF-885C2C8CA2EB}"/>
+          </ac:inkMkLst>
+        </pc:inkChg>
+      </pc:sldChg>
+    </pc:docChg>
+  </pc:docChgLst>
+</pc:chgInfo>
 </file>
 
 <file path=ppt/slideLayouts/slideLayout1.xml><?xml version="1.0" encoding="utf-8"?>
@@ -283,7 +386,7 @@
           <a:p>
             <a:fld id="{442ADAC7-FDB1-4402-BF64-07C10049A5AA}" type="datetimeFigureOut">
               <a:rPr lang="es-CO" smtClean="0"/>
-              <a:t>16/03/2022</a:t>
+              <a:t>20/03/2022</a:t>
             </a:fld>
             <a:endParaRPr lang="es-CO"/>
           </a:p>
@@ -483,7 +586,7 @@
           <a:p>
             <a:fld id="{442ADAC7-FDB1-4402-BF64-07C10049A5AA}" type="datetimeFigureOut">
               <a:rPr lang="es-CO" smtClean="0"/>
-              <a:t>16/03/2022</a:t>
+              <a:t>20/03/2022</a:t>
             </a:fld>
             <a:endParaRPr lang="es-CO"/>
           </a:p>
@@ -693,7 +796,7 @@
           <a:p>
             <a:fld id="{442ADAC7-FDB1-4402-BF64-07C10049A5AA}" type="datetimeFigureOut">
               <a:rPr lang="es-CO" smtClean="0"/>
-              <a:t>16/03/2022</a:t>
+              <a:t>20/03/2022</a:t>
             </a:fld>
             <a:endParaRPr lang="es-CO"/>
           </a:p>
@@ -893,7 +996,7 @@
           <a:p>
             <a:fld id="{442ADAC7-FDB1-4402-BF64-07C10049A5AA}" type="datetimeFigureOut">
               <a:rPr lang="es-CO" smtClean="0"/>
-              <a:t>16/03/2022</a:t>
+              <a:t>20/03/2022</a:t>
             </a:fld>
             <a:endParaRPr lang="es-CO"/>
           </a:p>
@@ -1169,7 +1272,7 @@
           <a:p>
             <a:fld id="{442ADAC7-FDB1-4402-BF64-07C10049A5AA}" type="datetimeFigureOut">
               <a:rPr lang="es-CO" smtClean="0"/>
-              <a:t>16/03/2022</a:t>
+              <a:t>20/03/2022</a:t>
             </a:fld>
             <a:endParaRPr lang="es-CO"/>
           </a:p>
@@ -1437,7 +1540,7 @@
           <a:p>
             <a:fld id="{442ADAC7-FDB1-4402-BF64-07C10049A5AA}" type="datetimeFigureOut">
               <a:rPr lang="es-CO" smtClean="0"/>
-              <a:t>16/03/2022</a:t>
+              <a:t>20/03/2022</a:t>
             </a:fld>
             <a:endParaRPr lang="es-CO"/>
           </a:p>
@@ -1852,7 +1955,7 @@
           <a:p>
             <a:fld id="{442ADAC7-FDB1-4402-BF64-07C10049A5AA}" type="datetimeFigureOut">
               <a:rPr lang="es-CO" smtClean="0"/>
-              <a:t>16/03/2022</a:t>
+              <a:t>20/03/2022</a:t>
             </a:fld>
             <a:endParaRPr lang="es-CO"/>
           </a:p>
@@ -1994,7 +2097,7 @@
           <a:p>
             <a:fld id="{442ADAC7-FDB1-4402-BF64-07C10049A5AA}" type="datetimeFigureOut">
               <a:rPr lang="es-CO" smtClean="0"/>
-              <a:t>16/03/2022</a:t>
+              <a:t>20/03/2022</a:t>
             </a:fld>
             <a:endParaRPr lang="es-CO"/>
           </a:p>
@@ -2107,7 +2210,7 @@
           <a:p>
             <a:fld id="{442ADAC7-FDB1-4402-BF64-07C10049A5AA}" type="datetimeFigureOut">
               <a:rPr lang="es-CO" smtClean="0"/>
-              <a:t>16/03/2022</a:t>
+              <a:t>20/03/2022</a:t>
             </a:fld>
             <a:endParaRPr lang="es-CO"/>
           </a:p>
@@ -2420,7 +2523,7 @@
           <a:p>
             <a:fld id="{442ADAC7-FDB1-4402-BF64-07C10049A5AA}" type="datetimeFigureOut">
               <a:rPr lang="es-CO" smtClean="0"/>
-              <a:t>16/03/2022</a:t>
+              <a:t>20/03/2022</a:t>
             </a:fld>
             <a:endParaRPr lang="es-CO"/>
           </a:p>
@@ -2709,7 +2812,7 @@
           <a:p>
             <a:fld id="{442ADAC7-FDB1-4402-BF64-07C10049A5AA}" type="datetimeFigureOut">
               <a:rPr lang="es-CO" smtClean="0"/>
-              <a:t>16/03/2022</a:t>
+              <a:t>20/03/2022</a:t>
             </a:fld>
             <a:endParaRPr lang="es-CO"/>
           </a:p>
@@ -2952,7 +3055,7 @@
           <a:p>
             <a:fld id="{442ADAC7-FDB1-4402-BF64-07C10049A5AA}" type="datetimeFigureOut">
               <a:rPr lang="es-CO" smtClean="0"/>
-              <a:t>16/03/2022</a:t>
+              <a:t>20/03/2022</a:t>
             </a:fld>
             <a:endParaRPr lang="es-CO"/>
           </a:p>
@@ -3383,7 +3486,7 @@
         </p:nvGrpSpPr>
         <p:grpSpPr>
           <a:xfrm>
-            <a:off x="7283822" y="2218765"/>
+            <a:off x="4827496" y="1369679"/>
             <a:ext cx="2492190" cy="914400"/>
             <a:chOff x="7283822" y="2218765"/>
             <a:chExt cx="2492190" cy="914400"/>
@@ -3545,161 +3648,6 @@
           </p:txBody>
         </p:sp>
       </p:grpSp>
-      <p:sp>
-        <p:nvSpPr>
-          <p:cNvPr id="9" name="Rectángulo: esquinas redondeadas 8">
-            <a:extLst>
-              <a:ext uri="{FF2B5EF4-FFF2-40B4-BE49-F238E27FC236}">
-                <a16:creationId xmlns:a16="http://schemas.microsoft.com/office/drawing/2014/main" id="{C6FD7F31-419D-4128-A4BA-18790853552F}"/>
-              </a:ext>
-            </a:extLst>
-          </p:cNvPr>
-          <p:cNvSpPr/>
-          <p:nvPr/>
-        </p:nvSpPr>
-        <p:spPr>
-          <a:xfrm>
-            <a:off x="7283822" y="1284195"/>
-            <a:ext cx="2537008" cy="2790264"/>
-          </a:xfrm>
-          <a:prstGeom prst="roundRect">
-            <a:avLst/>
-          </a:prstGeom>
-          <a:noFill/>
-          <a:ln w="57150">
-            <a:solidFill>
-              <a:schemeClr val="tx1"/>
-            </a:solidFill>
-          </a:ln>
-        </p:spPr>
-        <p:style>
-          <a:lnRef idx="2">
-            <a:schemeClr val="accent1">
-              <a:shade val="50000"/>
-            </a:schemeClr>
-          </a:lnRef>
-          <a:fillRef idx="1">
-            <a:schemeClr val="accent1"/>
-          </a:fillRef>
-          <a:effectRef idx="0">
-            <a:schemeClr val="accent1"/>
-          </a:effectRef>
-          <a:fontRef idx="minor">
-            <a:schemeClr val="lt1"/>
-          </a:fontRef>
-        </p:style>
-        <p:txBody>
-          <a:bodyPr rtlCol="0" anchor="ctr"/>
-          <a:lstStyle/>
-          <a:p>
-            <a:pPr algn="ctr"/>
-            <a:endParaRPr lang="es-CO"/>
-          </a:p>
-        </p:txBody>
-      </p:sp>
-      <p:sp>
-        <p:nvSpPr>
-          <p:cNvPr id="10" name="Rectángulo: esquinas redondeadas 9">
-            <a:extLst>
-              <a:ext uri="{FF2B5EF4-FFF2-40B4-BE49-F238E27FC236}">
-                <a16:creationId xmlns:a16="http://schemas.microsoft.com/office/drawing/2014/main" id="{C7AA86AC-DB02-4F50-A52C-7EF71C23175B}"/>
-              </a:ext>
-            </a:extLst>
-          </p:cNvPr>
-          <p:cNvSpPr/>
-          <p:nvPr/>
-        </p:nvSpPr>
-        <p:spPr>
-          <a:xfrm>
-            <a:off x="1640540" y="1284195"/>
-            <a:ext cx="2537008" cy="2790264"/>
-          </a:xfrm>
-          <a:prstGeom prst="roundRect">
-            <a:avLst/>
-          </a:prstGeom>
-          <a:noFill/>
-          <a:ln w="57150">
-            <a:solidFill>
-              <a:schemeClr val="tx1"/>
-            </a:solidFill>
-          </a:ln>
-        </p:spPr>
-        <p:style>
-          <a:lnRef idx="2">
-            <a:schemeClr val="accent1">
-              <a:shade val="50000"/>
-            </a:schemeClr>
-          </a:lnRef>
-          <a:fillRef idx="1">
-            <a:schemeClr val="accent1"/>
-          </a:fillRef>
-          <a:effectRef idx="0">
-            <a:schemeClr val="accent1"/>
-          </a:effectRef>
-          <a:fontRef idx="minor">
-            <a:schemeClr val="lt1"/>
-          </a:fontRef>
-        </p:style>
-        <p:txBody>
-          <a:bodyPr rtlCol="0" anchor="ctr"/>
-          <a:lstStyle/>
-          <a:p>
-            <a:pPr algn="ctr"/>
-            <a:endParaRPr lang="es-CO"/>
-          </a:p>
-        </p:txBody>
-      </p:sp>
-      <mc:AlternateContent xmlns:mc="http://schemas.openxmlformats.org/markup-compatibility/2006">
-        <mc:Choice xmlns:p14="http://schemas.microsoft.com/office/powerpoint/2010/main" Requires="p14">
-          <p:contentPart p14:bwMode="auto" r:id="rId4">
-            <p14:nvContentPartPr>
-              <p14:cNvPr id="14" name="Entrada de lápiz 13">
-                <a:extLst>
-                  <a:ext uri="{FF2B5EF4-FFF2-40B4-BE49-F238E27FC236}">
-                    <a16:creationId xmlns:a16="http://schemas.microsoft.com/office/drawing/2014/main" id="{A946909F-FA28-4708-BCDF-885C2C8CA2EB}"/>
-                  </a:ext>
-                </a:extLst>
-              </p14:cNvPr>
-              <p14:cNvContentPartPr/>
-              <p14:nvPr/>
-            </p14:nvContentPartPr>
-            <p14:xfrm>
-              <a:off x="6454101" y="1411242"/>
-              <a:ext cx="360" cy="360"/>
-            </p14:xfrm>
-          </p:contentPart>
-        </mc:Choice>
-        <mc:Fallback>
-          <p:pic>
-            <p:nvPicPr>
-              <p:cNvPr id="14" name="Entrada de lápiz 13">
-                <a:extLst>
-                  <a:ext uri="{FF2B5EF4-FFF2-40B4-BE49-F238E27FC236}">
-                    <a16:creationId xmlns:a16="http://schemas.microsoft.com/office/drawing/2014/main" id="{A946909F-FA28-4708-BCDF-885C2C8CA2EB}"/>
-                  </a:ext>
-                </a:extLst>
-              </p:cNvPr>
-              <p:cNvPicPr/>
-              <p:nvPr/>
-            </p:nvPicPr>
-            <p:blipFill>
-              <a:blip r:embed="rId5"/>
-              <a:stretch>
-                <a:fillRect/>
-              </a:stretch>
-            </p:blipFill>
-            <p:spPr>
-              <a:xfrm>
-                <a:off x="6445101" y="1402602"/>
-                <a:ext cx="18000" cy="18000"/>
-              </a:xfrm>
-              <a:prstGeom prst="rect">
-                <a:avLst/>
-              </a:prstGeom>
-            </p:spPr>
-          </p:pic>
-        </mc:Fallback>
-      </mc:AlternateContent>
       <p:grpSp>
         <p:nvGrpSpPr>
           <p:cNvPr id="32" name="Grupo 31">
@@ -3714,7 +3662,7 @@
         </p:nvGrpSpPr>
         <p:grpSpPr>
           <a:xfrm>
-            <a:off x="2094857" y="1729347"/>
+            <a:off x="1398171" y="880261"/>
             <a:ext cx="1628374" cy="1893235"/>
             <a:chOff x="2076450" y="1611965"/>
             <a:chExt cx="1628374" cy="1893235"/>
@@ -3926,6 +3874,222 @@
             </a:fontRef>
           </p:style>
         </p:cxnSp>
+      </p:grpSp>
+      <p:pic>
+        <p:nvPicPr>
+          <p:cNvPr id="6" name="Gráfico 5" descr="Taco con relleno sólido">
+            <a:extLst>
+              <a:ext uri="{FF2B5EF4-FFF2-40B4-BE49-F238E27FC236}">
+                <a16:creationId xmlns:a16="http://schemas.microsoft.com/office/drawing/2014/main" id="{24C91E4D-2214-4B51-A776-1D695991B62E}"/>
+              </a:ext>
+            </a:extLst>
+          </p:cNvPr>
+          <p:cNvPicPr>
+            <a:picLocks noChangeAspect="1"/>
+          </p:cNvPicPr>
+          <p:nvPr/>
+        </p:nvPicPr>
+        <p:blipFill>
+          <a:blip r:embed="rId4">
+            <a:extLst>
+              <a:ext uri="{28A0092B-C50C-407E-A947-70E740481C1C}">
+                <a14:useLocalDpi xmlns:a14="http://schemas.microsoft.com/office/drawing/2010/main" val="0"/>
+              </a:ext>
+              <a:ext uri="{96DAC541-7B7A-43D3-8B79-37D633B846F1}">
+                <asvg:svgBlip xmlns:asvg="http://schemas.microsoft.com/office/drawing/2016/SVG/main" r:embed="rId5"/>
+              </a:ext>
+            </a:extLst>
+          </a:blip>
+          <a:stretch>
+            <a:fillRect/>
+          </a:stretch>
+        </p:blipFill>
+        <p:spPr>
+          <a:xfrm>
+            <a:off x="1267402" y="4533740"/>
+            <a:ext cx="1800000" cy="1800000"/>
+          </a:xfrm>
+          <a:prstGeom prst="rect">
+            <a:avLst/>
+          </a:prstGeom>
+        </p:spPr>
+      </p:pic>
+      <p:pic>
+        <p:nvPicPr>
+          <p:cNvPr id="12" name="Gráfico 11" descr="Natación con relleno sólido">
+            <a:extLst>
+              <a:ext uri="{FF2B5EF4-FFF2-40B4-BE49-F238E27FC236}">
+                <a16:creationId xmlns:a16="http://schemas.microsoft.com/office/drawing/2014/main" id="{CCB69D72-597C-4FEC-8A1E-D7401C100EB7}"/>
+              </a:ext>
+            </a:extLst>
+          </p:cNvPr>
+          <p:cNvPicPr>
+            <a:picLocks noChangeAspect="1"/>
+          </p:cNvPicPr>
+          <p:nvPr/>
+        </p:nvPicPr>
+        <p:blipFill>
+          <a:blip r:embed="rId6">
+            <a:extLst>
+              <a:ext uri="{28A0092B-C50C-407E-A947-70E740481C1C}">
+                <a14:useLocalDpi xmlns:a14="http://schemas.microsoft.com/office/drawing/2010/main" val="0"/>
+              </a:ext>
+              <a:ext uri="{96DAC541-7B7A-43D3-8B79-37D633B846F1}">
+                <asvg:svgBlip xmlns:asvg="http://schemas.microsoft.com/office/drawing/2016/SVG/main" r:embed="rId7"/>
+              </a:ext>
+            </a:extLst>
+          </a:blip>
+          <a:stretch>
+            <a:fillRect/>
+          </a:stretch>
+        </p:blipFill>
+        <p:spPr>
+          <a:xfrm>
+            <a:off x="3026545" y="4533740"/>
+            <a:ext cx="1800000" cy="1800000"/>
+          </a:xfrm>
+          <a:prstGeom prst="rect">
+            <a:avLst/>
+          </a:prstGeom>
+        </p:spPr>
+      </p:pic>
+      <p:pic>
+        <p:nvPicPr>
+          <p:cNvPr id="15" name="Gráfico 14" descr="Claqueta con relleno sólido">
+            <a:extLst>
+              <a:ext uri="{FF2B5EF4-FFF2-40B4-BE49-F238E27FC236}">
+                <a16:creationId xmlns:a16="http://schemas.microsoft.com/office/drawing/2014/main" id="{B3C5E0FC-5222-4970-9E1A-5CBDDA262E8B}"/>
+              </a:ext>
+            </a:extLst>
+          </p:cNvPr>
+          <p:cNvPicPr>
+            <a:picLocks noChangeAspect="1"/>
+          </p:cNvPicPr>
+          <p:nvPr/>
+        </p:nvPicPr>
+        <p:blipFill>
+          <a:blip r:embed="rId8">
+            <a:extLst>
+              <a:ext uri="{28A0092B-C50C-407E-A947-70E740481C1C}">
+                <a14:useLocalDpi xmlns:a14="http://schemas.microsoft.com/office/drawing/2010/main" val="0"/>
+              </a:ext>
+              <a:ext uri="{96DAC541-7B7A-43D3-8B79-37D633B846F1}">
+                <asvg:svgBlip xmlns:asvg="http://schemas.microsoft.com/office/drawing/2016/SVG/main" r:embed="rId9"/>
+              </a:ext>
+            </a:extLst>
+          </a:blip>
+          <a:stretch>
+            <a:fillRect/>
+          </a:stretch>
+        </p:blipFill>
+        <p:spPr>
+          <a:xfrm>
+            <a:off x="7228438" y="4466505"/>
+            <a:ext cx="1800000" cy="1800000"/>
+          </a:xfrm>
+          <a:prstGeom prst="rect">
+            <a:avLst/>
+          </a:prstGeom>
+        </p:spPr>
+      </p:pic>
+      <p:grpSp>
+        <p:nvGrpSpPr>
+          <p:cNvPr id="24" name="Grupo 23">
+            <a:extLst>
+              <a:ext uri="{FF2B5EF4-FFF2-40B4-BE49-F238E27FC236}">
+                <a16:creationId xmlns:a16="http://schemas.microsoft.com/office/drawing/2014/main" id="{9320692C-5415-43CB-A951-17F3A5114376}"/>
+              </a:ext>
+            </a:extLst>
+          </p:cNvPr>
+          <p:cNvGrpSpPr/>
+          <p:nvPr/>
+        </p:nvGrpSpPr>
+        <p:grpSpPr>
+          <a:xfrm>
+            <a:off x="5127491" y="4533740"/>
+            <a:ext cx="1800000" cy="1800000"/>
+            <a:chOff x="9418623" y="2195353"/>
+            <a:chExt cx="1721387" cy="1704973"/>
+          </a:xfrm>
+        </p:grpSpPr>
+        <p:pic>
+          <p:nvPicPr>
+            <p:cNvPr id="19" name="Gráfico 18" descr="Cachorrito con relleno sólido">
+              <a:extLst>
+                <a:ext uri="{FF2B5EF4-FFF2-40B4-BE49-F238E27FC236}">
+                  <a16:creationId xmlns:a16="http://schemas.microsoft.com/office/drawing/2014/main" id="{DE0E5ECE-B382-4234-A0CD-68E87A6346FC}"/>
+                </a:ext>
+              </a:extLst>
+            </p:cNvPr>
+            <p:cNvPicPr>
+              <a:picLocks noChangeAspect="1"/>
+            </p:cNvPicPr>
+            <p:nvPr/>
+          </p:nvPicPr>
+          <p:blipFill>
+            <a:blip r:embed="rId10">
+              <a:extLst>
+                <a:ext uri="{28A0092B-C50C-407E-A947-70E740481C1C}">
+                  <a14:useLocalDpi xmlns:a14="http://schemas.microsoft.com/office/drawing/2010/main" val="0"/>
+                </a:ext>
+                <a:ext uri="{96DAC541-7B7A-43D3-8B79-37D633B846F1}">
+                  <asvg:svgBlip xmlns:asvg="http://schemas.microsoft.com/office/drawing/2016/SVG/main" r:embed="rId11"/>
+                </a:ext>
+              </a:extLst>
+            </a:blip>
+            <a:stretch>
+              <a:fillRect/>
+            </a:stretch>
+          </p:blipFill>
+          <p:spPr>
+            <a:xfrm>
+              <a:off x="9418623" y="2195353"/>
+              <a:ext cx="1156286" cy="1156286"/>
+            </a:xfrm>
+            <a:prstGeom prst="rect">
+              <a:avLst/>
+            </a:prstGeom>
+          </p:spPr>
+        </p:pic>
+        <p:pic>
+          <p:nvPicPr>
+            <p:cNvPr id="23" name="Gráfico 22" descr="Cachorrito 2 con relleno sólido">
+              <a:extLst>
+                <a:ext uri="{FF2B5EF4-FFF2-40B4-BE49-F238E27FC236}">
+                  <a16:creationId xmlns:a16="http://schemas.microsoft.com/office/drawing/2014/main" id="{F61752F7-FB9F-436C-8582-6E141CA567B4}"/>
+                </a:ext>
+              </a:extLst>
+            </p:cNvPr>
+            <p:cNvPicPr>
+              <a:picLocks noChangeAspect="1"/>
+            </p:cNvPicPr>
+            <p:nvPr/>
+          </p:nvPicPr>
+          <p:blipFill>
+            <a:blip r:embed="rId12">
+              <a:extLst>
+                <a:ext uri="{28A0092B-C50C-407E-A947-70E740481C1C}">
+                  <a14:useLocalDpi xmlns:a14="http://schemas.microsoft.com/office/drawing/2010/main" val="0"/>
+                </a:ext>
+                <a:ext uri="{96DAC541-7B7A-43D3-8B79-37D633B846F1}">
+                  <asvg:svgBlip xmlns:asvg="http://schemas.microsoft.com/office/drawing/2016/SVG/main" r:embed="rId13"/>
+                </a:ext>
+              </a:extLst>
+            </a:blip>
+            <a:stretch>
+              <a:fillRect/>
+            </a:stretch>
+          </p:blipFill>
+          <p:spPr>
+            <a:xfrm>
+              <a:off x="9983724" y="2744040"/>
+              <a:ext cx="1156286" cy="1156286"/>
+            </a:xfrm>
+            <a:prstGeom prst="rect">
+              <a:avLst/>
+            </a:prstGeom>
+          </p:spPr>
+        </p:pic>
       </p:grpSp>
     </p:spTree>
     <p:extLst>

</xml_diff>

<commit_message>
Se añade estilo al portafolio
</commit_message>
<xml_diff>
--- a/media/imagenes.pptx
+++ b/media/imagenes.pptx
@@ -115,7 +115,7 @@
 <file path=ppt/revisionInfo.xml><?xml version="1.0" encoding="utf-8"?>
 <p1510:revInfo xmlns:a="http://schemas.openxmlformats.org/drawingml/2006/main" xmlns:r="http://schemas.openxmlformats.org/officeDocument/2006/relationships" xmlns:p1510="http://schemas.microsoft.com/office/powerpoint/2015/10/main">
   <p1510:revLst>
-    <p1510:client id="{9E59245F-3329-463E-852B-63A0B238C239}" v="3" dt="2022-03-20T08:16:11.995"/>
+    <p1510:client id="{9E59245F-3329-463E-852B-63A0B238C239}" v="10" dt="2022-03-20T18:05:20.995"/>
   </p1510:revLst>
 </p1510:revInfo>
 </file>
@@ -125,16 +125,32 @@
   <pc:docChgLst>
     <pc:chgData name="Oscar Cita" userId="7f8d94126e5d8e0d" providerId="LiveId" clId="{9E59245F-3329-463E-852B-63A0B238C239}"/>
     <pc:docChg chg="custSel modSld">
-      <pc:chgData name="Oscar Cita" userId="7f8d94126e5d8e0d" providerId="LiveId" clId="{9E59245F-3329-463E-852B-63A0B238C239}" dt="2022-03-20T08:19:27.279" v="50" actId="1076"/>
+      <pc:chgData name="Oscar Cita" userId="7f8d94126e5d8e0d" providerId="LiveId" clId="{9E59245F-3329-463E-852B-63A0B238C239}" dt="2022-03-20T18:05:31.425" v="133" actId="14100"/>
       <pc:docMkLst>
         <pc:docMk/>
       </pc:docMkLst>
       <pc:sldChg chg="addSp delSp modSp mod">
-        <pc:chgData name="Oscar Cita" userId="7f8d94126e5d8e0d" providerId="LiveId" clId="{9E59245F-3329-463E-852B-63A0B238C239}" dt="2022-03-20T08:19:27.279" v="50" actId="1076"/>
+        <pc:chgData name="Oscar Cita" userId="7f8d94126e5d8e0d" providerId="LiveId" clId="{9E59245F-3329-463E-852B-63A0B238C239}" dt="2022-03-20T18:05:31.425" v="133" actId="14100"/>
         <pc:sldMkLst>
           <pc:docMk/>
           <pc:sldMk cId="4058740216" sldId="256"/>
         </pc:sldMkLst>
+        <pc:spChg chg="del mod topLvl">
+          <ac:chgData name="Oscar Cita" userId="7f8d94126e5d8e0d" providerId="LiveId" clId="{9E59245F-3329-463E-852B-63A0B238C239}" dt="2022-03-20T18:04:27.455" v="106" actId="478"/>
+          <ac:spMkLst>
+            <pc:docMk/>
+            <pc:sldMk cId="4058740216" sldId="256"/>
+            <ac:spMk id="7" creationId="{BFB7DA48-2D22-4F9D-A442-37042866719C}"/>
+          </ac:spMkLst>
+        </pc:spChg>
+        <pc:spChg chg="mod topLvl">
+          <ac:chgData name="Oscar Cita" userId="7f8d94126e5d8e0d" providerId="LiveId" clId="{9E59245F-3329-463E-852B-63A0B238C239}" dt="2022-03-20T18:05:20.995" v="114" actId="164"/>
+          <ac:spMkLst>
+            <pc:docMk/>
+            <pc:sldMk cId="4058740216" sldId="256"/>
+            <ac:spMk id="8" creationId="{3A43AA10-D93A-4DA8-81C6-5F00E9EEB48F}"/>
+          </ac:spMkLst>
+        </pc:spChg>
         <pc:spChg chg="del mod">
           <ac:chgData name="Oscar Cita" userId="7f8d94126e5d8e0d" providerId="LiveId" clId="{9E59245F-3329-463E-852B-63A0B238C239}" dt="2022-03-20T08:17:58.949" v="48" actId="478"/>
           <ac:spMkLst>
@@ -151,8 +167,48 @@
             <ac:spMk id="10" creationId="{C7AA86AC-DB02-4F50-A52C-7EF71C23175B}"/>
           </ac:spMkLst>
         </pc:spChg>
-        <pc:grpChg chg="mod">
-          <ac:chgData name="Oscar Cita" userId="7f8d94126e5d8e0d" providerId="LiveId" clId="{9E59245F-3329-463E-852B-63A0B238C239}" dt="2022-03-20T08:08:39.904" v="1" actId="1076"/>
+        <pc:spChg chg="mod topLvl">
+          <ac:chgData name="Oscar Cita" userId="7f8d94126e5d8e0d" providerId="LiveId" clId="{9E59245F-3329-463E-852B-63A0B238C239}" dt="2022-03-20T18:03:14.019" v="96" actId="164"/>
+          <ac:spMkLst>
+            <pc:docMk/>
+            <pc:sldMk cId="4058740216" sldId="256"/>
+            <ac:spMk id="18" creationId="{33BB628D-8B5C-4CBF-864A-18B42C708931}"/>
+          </ac:spMkLst>
+        </pc:spChg>
+        <pc:spChg chg="add mod">
+          <ac:chgData name="Oscar Cita" userId="7f8d94126e5d8e0d" providerId="LiveId" clId="{9E59245F-3329-463E-852B-63A0B238C239}" dt="2022-03-20T18:05:20.995" v="114" actId="164"/>
+          <ac:spMkLst>
+            <pc:docMk/>
+            <pc:sldMk cId="4058740216" sldId="256"/>
+            <ac:spMk id="25" creationId="{0CC1B03B-2B18-4D05-B179-20812C358D60}"/>
+          </ac:spMkLst>
+        </pc:spChg>
+        <pc:grpChg chg="add mod">
+          <ac:chgData name="Oscar Cita" userId="7f8d94126e5d8e0d" providerId="LiveId" clId="{9E59245F-3329-463E-852B-63A0B238C239}" dt="2022-03-20T18:02:37.833" v="84" actId="164"/>
+          <ac:grpSpMkLst>
+            <pc:docMk/>
+            <pc:sldMk cId="4058740216" sldId="256"/>
+            <ac:grpSpMk id="3" creationId="{8EA7A3B6-21A5-4D74-818F-89D5CB2230C6}"/>
+          </ac:grpSpMkLst>
+        </pc:grpChg>
+        <pc:grpChg chg="add mod">
+          <ac:chgData name="Oscar Cita" userId="7f8d94126e5d8e0d" providerId="LiveId" clId="{9E59245F-3329-463E-852B-63A0B238C239}" dt="2022-03-20T18:03:54.578" v="100" actId="1076"/>
+          <ac:grpSpMkLst>
+            <pc:docMk/>
+            <pc:sldMk cId="4058740216" sldId="256"/>
+            <ac:grpSpMk id="13" creationId="{060904B7-AA3B-4D46-B45F-DD6C23A4E5F8}"/>
+          </ac:grpSpMkLst>
+        </pc:grpChg>
+        <pc:grpChg chg="add mod">
+          <ac:chgData name="Oscar Cita" userId="7f8d94126e5d8e0d" providerId="LiveId" clId="{9E59245F-3329-463E-852B-63A0B238C239}" dt="2022-03-20T18:05:31.425" v="133" actId="14100"/>
+          <ac:grpSpMkLst>
+            <pc:docMk/>
+            <pc:sldMk cId="4058740216" sldId="256"/>
+            <ac:grpSpMk id="14" creationId="{55D7CA4C-C076-49AF-AD2B-A1014CBB6B35}"/>
+          </ac:grpSpMkLst>
+        </pc:grpChg>
+        <pc:grpChg chg="del mod">
+          <ac:chgData name="Oscar Cita" userId="7f8d94126e5d8e0d" providerId="LiveId" clId="{9E59245F-3329-463E-852B-63A0B238C239}" dt="2022-03-20T18:00:29.432" v="52" actId="165"/>
           <ac:grpSpMkLst>
             <pc:docMk/>
             <pc:sldMk cId="4058740216" sldId="256"/>
@@ -167,8 +223,8 @@
             <ac:grpSpMk id="24" creationId="{9320692C-5415-43CB-A951-17F3A5114376}"/>
           </ac:grpSpMkLst>
         </pc:grpChg>
-        <pc:grpChg chg="mod">
-          <ac:chgData name="Oscar Cita" userId="7f8d94126e5d8e0d" providerId="LiveId" clId="{9E59245F-3329-463E-852B-63A0B238C239}" dt="2022-03-20T08:08:36.114" v="0" actId="1076"/>
+        <pc:grpChg chg="del mod">
+          <ac:chgData name="Oscar Cita" userId="7f8d94126e5d8e0d" providerId="LiveId" clId="{9E59245F-3329-463E-852B-63A0B238C239}" dt="2022-03-20T18:01:57.694" v="61" actId="165"/>
           <ac:grpSpMkLst>
             <pc:docMk/>
             <pc:sldMk cId="4058740216" sldId="256"/>
@@ -181,6 +237,14 @@
             <pc:docMk/>
             <pc:sldMk cId="4058740216" sldId="256"/>
             <ac:picMk id="3" creationId="{09BB4083-7E70-4F90-A94F-856E9F829F00}"/>
+          </ac:picMkLst>
+        </pc:picChg>
+        <pc:picChg chg="mod topLvl">
+          <ac:chgData name="Oscar Cita" userId="7f8d94126e5d8e0d" providerId="LiveId" clId="{9E59245F-3329-463E-852B-63A0B238C239}" dt="2022-03-20T18:05:20.995" v="114" actId="164"/>
+          <ac:picMkLst>
+            <pc:docMk/>
+            <pc:sldMk cId="4058740216" sldId="256"/>
+            <ac:picMk id="5" creationId="{5C95BD2D-EC33-48B9-99FE-694D9497C481}"/>
           </ac:picMkLst>
         </pc:picChg>
         <pc:picChg chg="add mod">
@@ -231,6 +295,38 @@
             <ac:inkMk id="14" creationId="{A946909F-FA28-4708-BCDF-885C2C8CA2EB}"/>
           </ac:inkMkLst>
         </pc:inkChg>
+        <pc:cxnChg chg="mod topLvl">
+          <ac:chgData name="Oscar Cita" userId="7f8d94126e5d8e0d" providerId="LiveId" clId="{9E59245F-3329-463E-852B-63A0B238C239}" dt="2022-03-20T18:03:14.019" v="96" actId="164"/>
+          <ac:cxnSpMkLst>
+            <pc:docMk/>
+            <pc:sldMk cId="4058740216" sldId="256"/>
+            <ac:cxnSpMk id="20" creationId="{48B99B10-B5D2-42CF-B075-738963CB7003}"/>
+          </ac:cxnSpMkLst>
+        </pc:cxnChg>
+        <pc:cxnChg chg="mod topLvl">
+          <ac:chgData name="Oscar Cita" userId="7f8d94126e5d8e0d" providerId="LiveId" clId="{9E59245F-3329-463E-852B-63A0B238C239}" dt="2022-03-20T18:03:14.019" v="96" actId="164"/>
+          <ac:cxnSpMkLst>
+            <pc:docMk/>
+            <pc:sldMk cId="4058740216" sldId="256"/>
+            <ac:cxnSpMk id="22" creationId="{93D33D0D-E645-453D-95A7-CE681F4E436C}"/>
+          </ac:cxnSpMkLst>
+        </pc:cxnChg>
+        <pc:cxnChg chg="mod topLvl">
+          <ac:chgData name="Oscar Cita" userId="7f8d94126e5d8e0d" providerId="LiveId" clId="{9E59245F-3329-463E-852B-63A0B238C239}" dt="2022-03-20T18:03:14.019" v="96" actId="164"/>
+          <ac:cxnSpMkLst>
+            <pc:docMk/>
+            <pc:sldMk cId="4058740216" sldId="256"/>
+            <ac:cxnSpMk id="27" creationId="{B256D494-5388-44E7-AAD5-63C56ABBA1B4}"/>
+          </ac:cxnSpMkLst>
+        </pc:cxnChg>
+        <pc:cxnChg chg="mod topLvl">
+          <ac:chgData name="Oscar Cita" userId="7f8d94126e5d8e0d" providerId="LiveId" clId="{9E59245F-3329-463E-852B-63A0B238C239}" dt="2022-03-20T18:03:14.019" v="96" actId="164"/>
+          <ac:cxnSpMkLst>
+            <pc:docMk/>
+            <pc:sldMk cId="4058740216" sldId="256"/>
+            <ac:cxnSpMk id="31" creationId="{79A2942D-3AB8-4D0C-A513-AC8263E7694B}"/>
+          </ac:cxnSpMkLst>
+        </pc:cxnChg>
       </pc:sldChg>
     </pc:docChg>
   </pc:docChgLst>
@@ -3474,10 +3570,10 @@
       </p:grpSpPr>
       <p:grpSp>
         <p:nvGrpSpPr>
-          <p:cNvPr id="17" name="Grupo 16">
-            <a:extLst>
-              <a:ext uri="{FF2B5EF4-FFF2-40B4-BE49-F238E27FC236}">
-                <a16:creationId xmlns:a16="http://schemas.microsoft.com/office/drawing/2014/main" id="{1D65A095-BDD4-446B-BE96-72EFB0BA4847}"/>
+          <p:cNvPr id="13" name="Grupo 12">
+            <a:extLst>
+              <a:ext uri="{FF2B5EF4-FFF2-40B4-BE49-F238E27FC236}">
+                <a16:creationId xmlns:a16="http://schemas.microsoft.com/office/drawing/2014/main" id="{060904B7-AA3B-4D46-B45F-DD6C23A4E5F8}"/>
               </a:ext>
             </a:extLst>
           </p:cNvPr>
@@ -3486,186 +3582,10 @@
         </p:nvGrpSpPr>
         <p:grpSpPr>
           <a:xfrm>
-            <a:off x="4827496" y="1369679"/>
-            <a:ext cx="2492190" cy="914400"/>
-            <a:chOff x="7283822" y="2218765"/>
-            <a:chExt cx="2492190" cy="914400"/>
-          </a:xfrm>
-        </p:grpSpPr>
-        <p:pic>
-          <p:nvPicPr>
-            <p:cNvPr id="5" name="Gráfico 4" descr="Transferencia con relleno sólido">
-              <a:extLst>
-                <a:ext uri="{FF2B5EF4-FFF2-40B4-BE49-F238E27FC236}">
-                  <a16:creationId xmlns:a16="http://schemas.microsoft.com/office/drawing/2014/main" id="{5C95BD2D-EC33-48B9-99FE-694D9497C481}"/>
-                </a:ext>
-              </a:extLst>
-            </p:cNvPr>
-            <p:cNvPicPr>
-              <a:picLocks noChangeAspect="1"/>
-            </p:cNvPicPr>
-            <p:nvPr/>
-          </p:nvPicPr>
-          <p:blipFill>
-            <a:blip r:embed="rId2">
-              <a:extLst>
-                <a:ext uri="{28A0092B-C50C-407E-A947-70E740481C1C}">
-                  <a14:useLocalDpi xmlns:a14="http://schemas.microsoft.com/office/drawing/2010/main" val="0"/>
-                </a:ext>
-                <a:ext uri="{96DAC541-7B7A-43D3-8B79-37D633B846F1}">
-                  <asvg:svgBlip xmlns:asvg="http://schemas.microsoft.com/office/drawing/2016/SVG/main" r:embed="rId3"/>
-                </a:ext>
-              </a:extLst>
-            </a:blip>
-            <a:stretch>
-              <a:fillRect/>
-            </a:stretch>
-          </p:blipFill>
-          <p:spPr>
-            <a:xfrm>
-              <a:off x="8072717" y="2218765"/>
-              <a:ext cx="914400" cy="914400"/>
-            </a:xfrm>
-            <a:prstGeom prst="rect">
-              <a:avLst/>
-            </a:prstGeom>
-          </p:spPr>
-        </p:pic>
-        <p:sp>
-          <p:nvSpPr>
-            <p:cNvPr id="7" name="Rectángulo 6">
-              <a:extLst>
-                <a:ext uri="{FF2B5EF4-FFF2-40B4-BE49-F238E27FC236}">
-                  <a16:creationId xmlns:a16="http://schemas.microsoft.com/office/drawing/2014/main" id="{BFB7DA48-2D22-4F9D-A442-37042866719C}"/>
-                </a:ext>
-              </a:extLst>
-            </p:cNvPr>
-            <p:cNvSpPr/>
-            <p:nvPr/>
-          </p:nvSpPr>
-          <p:spPr>
-            <a:xfrm>
-              <a:off x="9169539" y="2218765"/>
-              <a:ext cx="606473" cy="914400"/>
-            </a:xfrm>
-            <a:prstGeom prst="rect">
-              <a:avLst/>
-            </a:prstGeom>
-            <a:noFill/>
-          </p:spPr>
-          <p:txBody>
-            <a:bodyPr wrap="square" lIns="91440" tIns="45720" rIns="91440" bIns="45720">
-              <a:spAutoFit/>
-            </a:bodyPr>
-            <a:lstStyle/>
-            <a:p>
-              <a:pPr algn="ctr"/>
-              <a:r>
-                <a:rPr lang="es-ES" sz="5400" dirty="0">
-                  <a:ln w="0"/>
-                  <a:effectLst>
-                    <a:outerShdw blurRad="38100" dist="19050" dir="2700000" algn="tl" rotWithShape="0">
-                      <a:schemeClr val="dk1">
-                        <a:alpha val="40000"/>
-                      </a:schemeClr>
-                    </a:outerShdw>
-                  </a:effectLst>
-                </a:rPr>
-                <a:t>A</a:t>
-              </a:r>
-              <a:endParaRPr lang="es-ES" sz="5400" b="0" cap="none" spc="0" dirty="0">
-                <a:ln w="0"/>
-                <a:solidFill>
-                  <a:schemeClr val="tx1"/>
-                </a:solidFill>
-                <a:effectLst>
-                  <a:outerShdw blurRad="38100" dist="19050" dir="2700000" algn="tl" rotWithShape="0">
-                    <a:schemeClr val="dk1">
-                      <a:alpha val="40000"/>
-                    </a:schemeClr>
-                  </a:outerShdw>
-                </a:effectLst>
-              </a:endParaRPr>
-            </a:p>
-          </p:txBody>
-        </p:sp>
-        <p:sp>
-          <p:nvSpPr>
-            <p:cNvPr id="8" name="Rectángulo 7">
-              <a:extLst>
-                <a:ext uri="{FF2B5EF4-FFF2-40B4-BE49-F238E27FC236}">
-                  <a16:creationId xmlns:a16="http://schemas.microsoft.com/office/drawing/2014/main" id="{3A43AA10-D93A-4DA8-81C6-5F00E9EEB48F}"/>
-                </a:ext>
-              </a:extLst>
-            </p:cNvPr>
-            <p:cNvSpPr/>
-            <p:nvPr/>
-          </p:nvSpPr>
-          <p:spPr>
-            <a:xfrm>
-              <a:off x="7283822" y="2218765"/>
-              <a:ext cx="606473" cy="914400"/>
-            </a:xfrm>
-            <a:prstGeom prst="rect">
-              <a:avLst/>
-            </a:prstGeom>
-            <a:noFill/>
-          </p:spPr>
-          <p:txBody>
-            <a:bodyPr wrap="square" lIns="91440" tIns="45720" rIns="91440" bIns="45720">
-              <a:spAutoFit/>
-            </a:bodyPr>
-            <a:lstStyle/>
-            <a:p>
-              <a:pPr algn="ctr"/>
-              <a:r>
-                <a:rPr lang="es-ES" sz="5400" dirty="0">
-                  <a:ln w="0"/>
-                  <a:effectLst>
-                    <a:outerShdw blurRad="38100" dist="19050" dir="2700000" algn="tl" rotWithShape="0">
-                      <a:schemeClr val="dk1">
-                        <a:alpha val="40000"/>
-                      </a:schemeClr>
-                    </a:outerShdw>
-                  </a:effectLst>
-                </a:rPr>
-                <a:t>A</a:t>
-              </a:r>
-              <a:endParaRPr lang="es-ES" sz="5400" b="0" cap="none" spc="0" dirty="0">
-                <a:ln w="0"/>
-                <a:solidFill>
-                  <a:schemeClr val="tx1"/>
-                </a:solidFill>
-                <a:effectLst>
-                  <a:outerShdw blurRad="38100" dist="19050" dir="2700000" algn="tl" rotWithShape="0">
-                    <a:schemeClr val="dk1">
-                      <a:alpha val="40000"/>
-                    </a:schemeClr>
-                  </a:outerShdw>
-                </a:effectLst>
-              </a:endParaRPr>
-            </a:p>
-          </p:txBody>
-        </p:sp>
-      </p:grpSp>
-      <p:grpSp>
-        <p:nvGrpSpPr>
-          <p:cNvPr id="32" name="Grupo 31">
-            <a:extLst>
-              <a:ext uri="{FF2B5EF4-FFF2-40B4-BE49-F238E27FC236}">
-                <a16:creationId xmlns:a16="http://schemas.microsoft.com/office/drawing/2014/main" id="{8CD24AB5-B67E-4E79-8582-0223A55C3750}"/>
-              </a:ext>
-            </a:extLst>
-          </p:cNvPr>
-          <p:cNvGrpSpPr/>
-          <p:nvPr/>
-        </p:nvGrpSpPr>
-        <p:grpSpPr>
-          <a:xfrm>
-            <a:off x="1398171" y="880261"/>
-            <a:ext cx="1628374" cy="1893235"/>
-            <a:chOff x="2076450" y="1611965"/>
-            <a:chExt cx="1628374" cy="1893235"/>
+            <a:off x="9329384" y="4425739"/>
+            <a:ext cx="1908000" cy="1908001"/>
+            <a:chOff x="1266091" y="880261"/>
+            <a:chExt cx="1908000" cy="1908001"/>
           </a:xfrm>
         </p:grpSpPr>
         <p:sp>
@@ -3682,7 +3602,7 @@
           </p:nvSpPr>
           <p:spPr>
             <a:xfrm>
-              <a:off x="3092824" y="2030506"/>
+              <a:off x="2414545" y="1298802"/>
               <a:ext cx="612000" cy="612000"/>
             </a:xfrm>
             <a:prstGeom prst="ellipse">
@@ -3736,7 +3656,7 @@
           </p:nvCxnSpPr>
           <p:spPr>
             <a:xfrm flipV="1">
-              <a:off x="3398824" y="1611965"/>
+              <a:off x="2720545" y="880261"/>
               <a:ext cx="0" cy="432000"/>
             </a:xfrm>
             <a:prstGeom prst="line">
@@ -3775,7 +3695,7 @@
           </p:nvCxnSpPr>
           <p:spPr>
             <a:xfrm flipH="1">
-              <a:off x="2287681" y="1640541"/>
+              <a:off x="1609402" y="908837"/>
               <a:ext cx="1116000" cy="0"/>
             </a:xfrm>
             <a:prstGeom prst="line">
@@ -3814,8 +3734,8 @@
           </p:nvCxnSpPr>
           <p:spPr>
             <a:xfrm flipV="1">
-              <a:off x="2308412" y="1611966"/>
-              <a:ext cx="0" cy="1893234"/>
+              <a:off x="1630133" y="880262"/>
+              <a:ext cx="0" cy="1908000"/>
             </a:xfrm>
             <a:prstGeom prst="line">
               <a:avLst/>
@@ -3846,13 +3766,15 @@
                 </a:ext>
               </a:extLst>
             </p:cNvPr>
-            <p:cNvCxnSpPr/>
+            <p:cNvCxnSpPr>
+              <a:cxnSpLocks/>
+            </p:cNvCxnSpPr>
             <p:nvPr/>
           </p:nvCxnSpPr>
           <p:spPr>
             <a:xfrm>
-              <a:off x="2076450" y="3505200"/>
-              <a:ext cx="1628374" cy="0"/>
+              <a:off x="1266091" y="2773496"/>
+              <a:ext cx="1908000" cy="0"/>
             </a:xfrm>
             <a:prstGeom prst="line">
               <a:avLst/>
@@ -3890,13 +3812,13 @@
           <p:nvPr/>
         </p:nvPicPr>
         <p:blipFill>
-          <a:blip r:embed="rId4">
+          <a:blip r:embed="rId2">
             <a:extLst>
               <a:ext uri="{28A0092B-C50C-407E-A947-70E740481C1C}">
                 <a14:useLocalDpi xmlns:a14="http://schemas.microsoft.com/office/drawing/2010/main" val="0"/>
               </a:ext>
               <a:ext uri="{96DAC541-7B7A-43D3-8B79-37D633B846F1}">
-                <asvg:svgBlip xmlns:asvg="http://schemas.microsoft.com/office/drawing/2016/SVG/main" r:embed="rId5"/>
+                <asvg:svgBlip xmlns:asvg="http://schemas.microsoft.com/office/drawing/2016/SVG/main" r:embed="rId3"/>
               </a:ext>
             </a:extLst>
           </a:blip>
@@ -3929,13 +3851,13 @@
           <p:nvPr/>
         </p:nvPicPr>
         <p:blipFill>
-          <a:blip r:embed="rId6">
+          <a:blip r:embed="rId4">
             <a:extLst>
               <a:ext uri="{28A0092B-C50C-407E-A947-70E740481C1C}">
                 <a14:useLocalDpi xmlns:a14="http://schemas.microsoft.com/office/drawing/2010/main" val="0"/>
               </a:ext>
               <a:ext uri="{96DAC541-7B7A-43D3-8B79-37D633B846F1}">
-                <asvg:svgBlip xmlns:asvg="http://schemas.microsoft.com/office/drawing/2016/SVG/main" r:embed="rId7"/>
+                <asvg:svgBlip xmlns:asvg="http://schemas.microsoft.com/office/drawing/2016/SVG/main" r:embed="rId5"/>
               </a:ext>
             </a:extLst>
           </a:blip>
@@ -3968,13 +3890,13 @@
           <p:nvPr/>
         </p:nvPicPr>
         <p:blipFill>
-          <a:blip r:embed="rId8">
+          <a:blip r:embed="rId6">
             <a:extLst>
               <a:ext uri="{28A0092B-C50C-407E-A947-70E740481C1C}">
                 <a14:useLocalDpi xmlns:a14="http://schemas.microsoft.com/office/drawing/2010/main" val="0"/>
               </a:ext>
               <a:ext uri="{96DAC541-7B7A-43D3-8B79-37D633B846F1}">
-                <asvg:svgBlip xmlns:asvg="http://schemas.microsoft.com/office/drawing/2016/SVG/main" r:embed="rId9"/>
+                <asvg:svgBlip xmlns:asvg="http://schemas.microsoft.com/office/drawing/2016/SVG/main" r:embed="rId7"/>
               </a:ext>
             </a:extLst>
           </a:blip>
@@ -4027,13 +3949,13 @@
             <p:nvPr/>
           </p:nvPicPr>
           <p:blipFill>
-            <a:blip r:embed="rId10">
+            <a:blip r:embed="rId8">
               <a:extLst>
                 <a:ext uri="{28A0092B-C50C-407E-A947-70E740481C1C}">
                   <a14:useLocalDpi xmlns:a14="http://schemas.microsoft.com/office/drawing/2010/main" val="0"/>
                 </a:ext>
                 <a:ext uri="{96DAC541-7B7A-43D3-8B79-37D633B846F1}">
-                  <asvg:svgBlip xmlns:asvg="http://schemas.microsoft.com/office/drawing/2016/SVG/main" r:embed="rId11"/>
+                  <asvg:svgBlip xmlns:asvg="http://schemas.microsoft.com/office/drawing/2016/SVG/main" r:embed="rId9"/>
                 </a:ext>
               </a:extLst>
             </a:blip>
@@ -4066,13 +3988,13 @@
             <p:nvPr/>
           </p:nvPicPr>
           <p:blipFill>
-            <a:blip r:embed="rId12">
+            <a:blip r:embed="rId10">
               <a:extLst>
                 <a:ext uri="{28A0092B-C50C-407E-A947-70E740481C1C}">
                   <a14:useLocalDpi xmlns:a14="http://schemas.microsoft.com/office/drawing/2010/main" val="0"/>
                 </a:ext>
                 <a:ext uri="{96DAC541-7B7A-43D3-8B79-37D633B846F1}">
-                  <asvg:svgBlip xmlns:asvg="http://schemas.microsoft.com/office/drawing/2016/SVG/main" r:embed="rId13"/>
+                  <asvg:svgBlip xmlns:asvg="http://schemas.microsoft.com/office/drawing/2016/SVG/main" r:embed="rId11"/>
                 </a:ext>
               </a:extLst>
             </a:blip>
@@ -4090,6 +4012,182 @@
             </a:prstGeom>
           </p:spPr>
         </p:pic>
+      </p:grpSp>
+      <p:grpSp>
+        <p:nvGrpSpPr>
+          <p:cNvPr id="14" name="Grupo 13">
+            <a:extLst>
+              <a:ext uri="{FF2B5EF4-FFF2-40B4-BE49-F238E27FC236}">
+                <a16:creationId xmlns:a16="http://schemas.microsoft.com/office/drawing/2014/main" id="{55D7CA4C-C076-49AF-AD2B-A1014CBB6B35}"/>
+              </a:ext>
+            </a:extLst>
+          </p:cNvPr>
+          <p:cNvGrpSpPr/>
+          <p:nvPr/>
+        </p:nvGrpSpPr>
+        <p:grpSpPr>
+          <a:xfrm>
+            <a:off x="8056880" y="524259"/>
+            <a:ext cx="2448000" cy="2448000"/>
+            <a:chOff x="8056880" y="524259"/>
+            <a:chExt cx="2992318" cy="2462773"/>
+          </a:xfrm>
+        </p:grpSpPr>
+        <p:pic>
+          <p:nvPicPr>
+            <p:cNvPr id="5" name="Gráfico 4" descr="Transferencia con relleno sólido">
+              <a:extLst>
+                <a:ext uri="{FF2B5EF4-FFF2-40B4-BE49-F238E27FC236}">
+                  <a16:creationId xmlns:a16="http://schemas.microsoft.com/office/drawing/2014/main" id="{5C95BD2D-EC33-48B9-99FE-694D9497C481}"/>
+                </a:ext>
+              </a:extLst>
+            </p:cNvPr>
+            <p:cNvPicPr>
+              <a:picLocks noChangeAspect="1"/>
+            </p:cNvPicPr>
+            <p:nvPr/>
+          </p:nvPicPr>
+          <p:blipFill>
+            <a:blip r:embed="rId12">
+              <a:extLst>
+                <a:ext uri="{28A0092B-C50C-407E-A947-70E740481C1C}">
+                  <a14:useLocalDpi xmlns:a14="http://schemas.microsoft.com/office/drawing/2010/main" val="0"/>
+                </a:ext>
+                <a:ext uri="{96DAC541-7B7A-43D3-8B79-37D633B846F1}">
+                  <asvg:svgBlip xmlns:asvg="http://schemas.microsoft.com/office/drawing/2016/SVG/main" r:embed="rId13"/>
+                </a:ext>
+              </a:extLst>
+            </a:blip>
+            <a:stretch>
+              <a:fillRect/>
+            </a:stretch>
+          </p:blipFill>
+          <p:spPr>
+            <a:xfrm>
+              <a:off x="9028438" y="524259"/>
+              <a:ext cx="1150548" cy="2462773"/>
+            </a:xfrm>
+            <a:prstGeom prst="rect">
+              <a:avLst/>
+            </a:prstGeom>
+          </p:spPr>
+        </p:pic>
+        <p:sp>
+          <p:nvSpPr>
+            <p:cNvPr id="8" name="Rectángulo 7">
+              <a:extLst>
+                <a:ext uri="{FF2B5EF4-FFF2-40B4-BE49-F238E27FC236}">
+                  <a16:creationId xmlns:a16="http://schemas.microsoft.com/office/drawing/2014/main" id="{3A43AA10-D93A-4DA8-81C6-5F00E9EEB48F}"/>
+                </a:ext>
+              </a:extLst>
+            </p:cNvPr>
+            <p:cNvSpPr/>
+            <p:nvPr/>
+          </p:nvSpPr>
+          <p:spPr>
+            <a:xfrm>
+              <a:off x="8056880" y="1150432"/>
+              <a:ext cx="971558" cy="1200329"/>
+            </a:xfrm>
+            <a:prstGeom prst="rect">
+              <a:avLst/>
+            </a:prstGeom>
+            <a:noFill/>
+          </p:spPr>
+          <p:txBody>
+            <a:bodyPr wrap="square" lIns="91440" tIns="45720" rIns="91440" bIns="45720">
+              <a:spAutoFit/>
+            </a:bodyPr>
+            <a:lstStyle/>
+            <a:p>
+              <a:pPr algn="ctr"/>
+              <a:r>
+                <a:rPr lang="es-ES" sz="7200" dirty="0">
+                  <a:ln w="0"/>
+                  <a:effectLst>
+                    <a:outerShdw blurRad="38100" dist="19050" dir="2700000" algn="tl" rotWithShape="0">
+                      <a:schemeClr val="dk1">
+                        <a:alpha val="40000"/>
+                      </a:schemeClr>
+                    </a:outerShdw>
+                  </a:effectLst>
+                </a:rPr>
+                <a:t>A</a:t>
+              </a:r>
+              <a:endParaRPr lang="es-ES" sz="7200" b="0" cap="none" spc="0" dirty="0">
+                <a:ln w="0"/>
+                <a:solidFill>
+                  <a:schemeClr val="tx1"/>
+                </a:solidFill>
+                <a:effectLst>
+                  <a:outerShdw blurRad="38100" dist="19050" dir="2700000" algn="tl" rotWithShape="0">
+                    <a:schemeClr val="dk1">
+                      <a:alpha val="40000"/>
+                    </a:schemeClr>
+                  </a:outerShdw>
+                </a:effectLst>
+              </a:endParaRPr>
+            </a:p>
+          </p:txBody>
+        </p:sp>
+        <p:sp>
+          <p:nvSpPr>
+            <p:cNvPr id="25" name="Rectángulo 24">
+              <a:extLst>
+                <a:ext uri="{FF2B5EF4-FFF2-40B4-BE49-F238E27FC236}">
+                  <a16:creationId xmlns:a16="http://schemas.microsoft.com/office/drawing/2014/main" id="{0CC1B03B-2B18-4D05-B179-20812C358D60}"/>
+                </a:ext>
+              </a:extLst>
+            </p:cNvPr>
+            <p:cNvSpPr/>
+            <p:nvPr/>
+          </p:nvSpPr>
+          <p:spPr>
+            <a:xfrm>
+              <a:off x="10077640" y="1150432"/>
+              <a:ext cx="971558" cy="1200329"/>
+            </a:xfrm>
+            <a:prstGeom prst="rect">
+              <a:avLst/>
+            </a:prstGeom>
+            <a:noFill/>
+          </p:spPr>
+          <p:txBody>
+            <a:bodyPr wrap="square" lIns="91440" tIns="45720" rIns="91440" bIns="45720">
+              <a:spAutoFit/>
+            </a:bodyPr>
+            <a:lstStyle/>
+            <a:p>
+              <a:pPr algn="ctr"/>
+              <a:r>
+                <a:rPr lang="es-ES" sz="7200" dirty="0">
+                  <a:ln w="0"/>
+                  <a:effectLst>
+                    <a:outerShdw blurRad="38100" dist="19050" dir="2700000" algn="tl" rotWithShape="0">
+                      <a:schemeClr val="dk1">
+                        <a:alpha val="40000"/>
+                      </a:schemeClr>
+                    </a:outerShdw>
+                  </a:effectLst>
+                </a:rPr>
+                <a:t>A</a:t>
+              </a:r>
+              <a:endParaRPr lang="es-ES" sz="7200" b="0" cap="none" spc="0" dirty="0">
+                <a:ln w="0"/>
+                <a:solidFill>
+                  <a:schemeClr val="tx1"/>
+                </a:solidFill>
+                <a:effectLst>
+                  <a:outerShdw blurRad="38100" dist="19050" dir="2700000" algn="tl" rotWithShape="0">
+                    <a:schemeClr val="dk1">
+                      <a:alpha val="40000"/>
+                    </a:schemeClr>
+                  </a:outerShdw>
+                </a:effectLst>
+              </a:endParaRPr>
+            </a:p>
+          </p:txBody>
+        </p:sp>
       </p:grpSp>
     </p:spTree>
     <p:extLst>

</xml_diff>